<commit_message>
Made a few changes to presentation
</commit_message>
<xml_diff>
--- a/presentation/Presentation.pptx
+++ b/presentation/Presentation.pptx
@@ -1590,11 +1590,11 @@
   <dgm:cxnLst>
     <dgm:cxn modelId="{EF0E431D-53A7-4173-B9BE-2DCC8FA9D667}" type="presOf" srcId="{DBB953E5-0FC9-42BD-A3B4-B7630A52C4AF}" destId="{BA788BFF-BCB6-4FA6-92BA-6387BC7821CD}" srcOrd="0" destOrd="0" presId="urn:microsoft.com/office/officeart/2018/2/layout/IconVerticalSolidList"/>
     <dgm:cxn modelId="{9E4E4820-3A6C-4E67-9D55-0B5DA53499DF}" type="presOf" srcId="{E54AB3FE-B642-48B5-AAB9-1896845BF7E4}" destId="{CE0FF243-8A81-4084-8730-2544CE201205}" srcOrd="0" destOrd="0" presId="urn:microsoft.com/office/officeart/2018/2/layout/IconVerticalSolidList"/>
+    <dgm:cxn modelId="{CE27CA5A-82F3-492E-9ADD-3DB026DC0AC6}" type="presOf" srcId="{94425574-7C8F-4623-BBA7-8B987C7BA70E}" destId="{8D936D3E-CA2B-4E3F-82CD-00B56B5F13E5}" srcOrd="0" destOrd="0" presId="urn:microsoft.com/office/officeart/2018/2/layout/IconVerticalSolidList"/>
     <dgm:cxn modelId="{0309715B-A8B9-42CC-B8E6-79325980575F}" type="presOf" srcId="{AEADC962-DB21-44FF-9A6A-91DCBD64B1ED}" destId="{63CB5BBA-53F0-431C-957E-5330D33B5B51}" srcOrd="0" destOrd="0" presId="urn:microsoft.com/office/officeart/2018/2/layout/IconVerticalSolidList"/>
     <dgm:cxn modelId="{43C8A167-63A7-48DB-A4E1-B3B503148AE6}" type="presOf" srcId="{518B1731-B7E2-4A97-90E8-01B73A0D4CDE}" destId="{06322738-5587-4579-B8CB-00A06EA6685E}" srcOrd="0" destOrd="0" presId="urn:microsoft.com/office/officeart/2018/2/layout/IconVerticalSolidList"/>
     <dgm:cxn modelId="{2348096B-C263-4B4E-B8E0-13658ED76315}" type="presOf" srcId="{98BFD9D4-44CA-4372-9F94-92CB043BDE79}" destId="{8A87C3F2-6EDD-4E35-BE36-FB906E79B88B}" srcOrd="0" destOrd="0" presId="urn:microsoft.com/office/officeart/2018/2/layout/IconVerticalSolidList"/>
     <dgm:cxn modelId="{71962876-CB92-4DB5-97C4-660F0BE4839F}" srcId="{E54AB3FE-B642-48B5-AAB9-1896845BF7E4}" destId="{98BFD9D4-44CA-4372-9F94-92CB043BDE79}" srcOrd="3" destOrd="0" parTransId="{CDBA8443-4FDD-4AB1-BC75-FAB19B819323}" sibTransId="{14962467-9529-4BC7-A9A7-3FE6377589DD}"/>
-    <dgm:cxn modelId="{CE27CA5A-82F3-492E-9ADD-3DB026DC0AC6}" type="presOf" srcId="{94425574-7C8F-4623-BBA7-8B987C7BA70E}" destId="{8D936D3E-CA2B-4E3F-82CD-00B56B5F13E5}" srcOrd="0" destOrd="0" presId="urn:microsoft.com/office/officeart/2018/2/layout/IconVerticalSolidList"/>
     <dgm:cxn modelId="{A0A8E6C3-F43D-412A-A98A-54F3E788C9D0}" type="presOf" srcId="{383AC9ED-1082-4A39-A926-AE22545137CD}" destId="{A172A853-989C-4481-9917-E8D24F241119}" srcOrd="0" destOrd="0" presId="urn:microsoft.com/office/officeart/2018/2/layout/IconVerticalSolidList"/>
     <dgm:cxn modelId="{2937ACC5-53CE-4E1E-B17A-0D6D8A9CBA08}" srcId="{E54AB3FE-B642-48B5-AAB9-1896845BF7E4}" destId="{DBB953E5-0FC9-42BD-A3B4-B7630A52C4AF}" srcOrd="4" destOrd="0" parTransId="{C62D7E90-2025-434C-BBB7-F1D9AA94B065}" sibTransId="{CEAE95E4-BC64-4E9E-990D-E03504E8E752}"/>
     <dgm:cxn modelId="{F1BA28CD-8946-4AE8-BB88-AD6872683B44}" srcId="{E54AB3FE-B642-48B5-AAB9-1896845BF7E4}" destId="{518B1731-B7E2-4A97-90E8-01B73A0D4CDE}" srcOrd="2" destOrd="0" parTransId="{8D56ECC3-A3C8-42E3-A170-DA530F0581A8}" sibTransId="{B98CC5F2-6B18-480D-B0C2-E6867400CC07}"/>
@@ -4015,7 +4015,7 @@
           <a:p>
             <a:fld id="{D28F23B4-1D94-4598-8B85-4879D0A8561B}" type="datetimeFigureOut">
               <a:rPr lang="en-US" smtClean="0"/>
-              <a:t>7/5/2019</a:t>
+              <a:t>7/5/19</a:t>
             </a:fld>
             <a:endParaRPr lang="en-US"/>
           </a:p>
@@ -4597,7 +4597,7 @@
           <a:p>
             <a:fld id="{E982C090-29EF-40AB-AE72-836E1D12E040}" type="datetimeFigureOut">
               <a:rPr lang="en-US" smtClean="0"/>
-              <a:t>7/5/2019</a:t>
+              <a:t>7/5/19</a:t>
             </a:fld>
             <a:endParaRPr lang="en-US"/>
           </a:p>
@@ -4795,7 +4795,7 @@
           <a:p>
             <a:fld id="{E982C090-29EF-40AB-AE72-836E1D12E040}" type="datetimeFigureOut">
               <a:rPr lang="en-US" smtClean="0"/>
-              <a:t>7/5/2019</a:t>
+              <a:t>7/5/19</a:t>
             </a:fld>
             <a:endParaRPr lang="en-US"/>
           </a:p>
@@ -5003,7 +5003,7 @@
           <a:p>
             <a:fld id="{E982C090-29EF-40AB-AE72-836E1D12E040}" type="datetimeFigureOut">
               <a:rPr lang="en-US" smtClean="0"/>
-              <a:t>7/5/2019</a:t>
+              <a:t>7/5/19</a:t>
             </a:fld>
             <a:endParaRPr lang="en-US"/>
           </a:p>
@@ -5201,7 +5201,7 @@
           <a:p>
             <a:fld id="{E982C090-29EF-40AB-AE72-836E1D12E040}" type="datetimeFigureOut">
               <a:rPr lang="en-US" smtClean="0"/>
-              <a:t>7/5/2019</a:t>
+              <a:t>7/5/19</a:t>
             </a:fld>
             <a:endParaRPr lang="en-US"/>
           </a:p>
@@ -5476,7 +5476,7 @@
           <a:p>
             <a:fld id="{E982C090-29EF-40AB-AE72-836E1D12E040}" type="datetimeFigureOut">
               <a:rPr lang="en-US" smtClean="0"/>
-              <a:t>7/5/2019</a:t>
+              <a:t>7/5/19</a:t>
             </a:fld>
             <a:endParaRPr lang="en-US"/>
           </a:p>
@@ -5741,7 +5741,7 @@
           <a:p>
             <a:fld id="{E982C090-29EF-40AB-AE72-836E1D12E040}" type="datetimeFigureOut">
               <a:rPr lang="en-US" smtClean="0"/>
-              <a:t>7/5/2019</a:t>
+              <a:t>7/5/19</a:t>
             </a:fld>
             <a:endParaRPr lang="en-US"/>
           </a:p>
@@ -6153,7 +6153,7 @@
           <a:p>
             <a:fld id="{E982C090-29EF-40AB-AE72-836E1D12E040}" type="datetimeFigureOut">
               <a:rPr lang="en-US" smtClean="0"/>
-              <a:t>7/5/2019</a:t>
+              <a:t>7/5/19</a:t>
             </a:fld>
             <a:endParaRPr lang="en-US"/>
           </a:p>
@@ -6294,7 +6294,7 @@
           <a:p>
             <a:fld id="{E982C090-29EF-40AB-AE72-836E1D12E040}" type="datetimeFigureOut">
               <a:rPr lang="en-US" smtClean="0"/>
-              <a:t>7/5/2019</a:t>
+              <a:t>7/5/19</a:t>
             </a:fld>
             <a:endParaRPr lang="en-US"/>
           </a:p>
@@ -6407,7 +6407,7 @@
           <a:p>
             <a:fld id="{E982C090-29EF-40AB-AE72-836E1D12E040}" type="datetimeFigureOut">
               <a:rPr lang="en-US" smtClean="0"/>
-              <a:t>7/5/2019</a:t>
+              <a:t>7/5/19</a:t>
             </a:fld>
             <a:endParaRPr lang="en-US"/>
           </a:p>
@@ -6718,7 +6718,7 @@
           <a:p>
             <a:fld id="{E982C090-29EF-40AB-AE72-836E1D12E040}" type="datetimeFigureOut">
               <a:rPr lang="en-US" smtClean="0"/>
-              <a:t>7/5/2019</a:t>
+              <a:t>7/5/19</a:t>
             </a:fld>
             <a:endParaRPr lang="en-US"/>
           </a:p>
@@ -7006,7 +7006,7 @@
           <a:p>
             <a:fld id="{E982C090-29EF-40AB-AE72-836E1D12E040}" type="datetimeFigureOut">
               <a:rPr lang="en-US" smtClean="0"/>
-              <a:t>7/5/2019</a:t>
+              <a:t>7/5/19</a:t>
             </a:fld>
             <a:endParaRPr lang="en-US"/>
           </a:p>
@@ -7250,7 +7250,7 @@
           <a:p>
             <a:fld id="{E982C090-29EF-40AB-AE72-836E1D12E040}" type="datetimeFigureOut">
               <a:rPr lang="en-US" smtClean="0"/>
-              <a:t>7/5/2019</a:t>
+              <a:t>7/5/19</a:t>
             </a:fld>
             <a:endParaRPr lang="en-US"/>
           </a:p>
@@ -9228,7 +9228,7 @@
           <a:p>
             <a:r>
               <a:rPr lang="en-US" dirty="0"/>
-              <a:t>Data Scientist job is highly in demand in </a:t>
+              <a:t>Data Scientist jobs are in high demand in </a:t>
             </a:r>
             <a:r>
               <a:rPr lang="en-US" dirty="0">
@@ -9240,7 +9240,7 @@
             </a:r>
             <a:r>
               <a:rPr lang="en-US" dirty="0"/>
-              <a:t> city and </a:t>
+              <a:t> and with </a:t>
             </a:r>
             <a:r>
               <a:rPr lang="en-US" dirty="0">
@@ -9252,7 +9252,7 @@
             </a:r>
             <a:r>
               <a:rPr lang="en-US" dirty="0"/>
-              <a:t> company.</a:t>
+              <a:t> </a:t>
             </a:r>
           </a:p>
           <a:p>
@@ -9333,7 +9333,13 @@
           <a:p>
             <a:r>
               <a:rPr lang="en-US" sz="2400" dirty="0"/>
-              <a:t>There is a shortage of 151,717 people with data science skills, with particularly acute shortages in New York City, San Francisco, and LA. (Use those three cities for our focus?)The 2020 estimate calls for 2.7 million job postings for data science and analytics roles</a:t>
+              <a:t>There is a shortage of 151,717 people with data science skills, with particularly acute shortages in New York City, San Francisco, and LA. </a:t>
+            </a:r>
+          </a:p>
+          <a:p>
+            <a:r>
+              <a:rPr lang="en-US" sz="2400" dirty="0"/>
+              <a:t>The 2020 estimate calls for 2.7 million job postings for data science and analytics roles</a:t>
             </a:r>
           </a:p>
         </p:txBody>
@@ -9441,15 +9447,7 @@
             </a:pPr>
             <a:r>
               <a:rPr lang="en-US" dirty="0"/>
-              <a:t>As we are doing this course of Data Analytics  at </a:t>
-            </a:r>
-            <a:r>
-              <a:rPr lang="en-US" dirty="0" err="1"/>
-              <a:t>UT,we</a:t>
-            </a:r>
-            <a:r>
-              <a:rPr lang="en-US" dirty="0"/>
-              <a:t>  thought of working on this project. It will be interesting to explore the job market for Data Science because that will be our next step.</a:t>
+              <a:t>As students enrolled in a Data Analytics course at UT, we thought this project would be beneficial to both ourselves and our classmates—to explore the job market in this field because naturally this will be our next step.</a:t>
             </a:r>
           </a:p>
           <a:p>
@@ -9524,9 +9522,10 @@
               <a:t> </a:t>
             </a:r>
             <a:r>
-              <a:rPr lang="en-US" dirty="0"/>
-              <a:t>Found data on Kaggle.com</a:t>
+              <a:rPr lang="en-US" dirty="0" err="1"/>
+              <a:t>Kaggle.com</a:t>
             </a:r>
+            <a:endParaRPr lang="en-US" dirty="0"/>
           </a:p>
           <a:p>
             <a:pPr marL="0" indent="0">
@@ -9534,21 +9533,8 @@
             </a:pPr>
             <a:r>
               <a:rPr lang="en-US" dirty="0"/>
-              <a:t>- Found CSV files for some major cities in </a:t>
+              <a:t>- CSV files of 15 major cities in USA. The data was from LinkedIn for jobs posted in August 2018</a:t>
             </a:r>
-            <a:r>
-              <a:rPr lang="en-US" dirty="0" err="1"/>
-              <a:t>USA.The</a:t>
-            </a:r>
-            <a:r>
-              <a:rPr lang="en-US" dirty="0"/>
-              <a:t> data was from LinkedIn for the year 2018</a:t>
-            </a:r>
-          </a:p>
-          <a:p>
-            <a:pPr marL="0" indent="0" algn="ctr">
-              <a:buNone/>
-            </a:pPr>
             <a:endParaRPr lang="en-US" b="1" dirty="0">
               <a:solidFill>
                 <a:srgbClr val="C00000"/>

</xml_diff>